<commit_message>
Fixing and fitting to workflow
</commit_message>
<xml_diff>
--- a/Business Process-Rent Car.pptx
+++ b/Business Process-Rent Car.pptx
@@ -3434,7 +3434,7 @@
         <p:spPr>
           <a:xfrm>
             <a:off x="4867835" y="1353671"/>
-            <a:ext cx="2375647" cy="2832847"/>
+            <a:ext cx="2375647" cy="4442009"/>
           </a:xfrm>
           <a:prstGeom prst="rect">
             <a:avLst/>
@@ -3442,15 +3442,15 @@
         </p:spPr>
         <p:style>
           <a:lnRef idx="2">
-            <a:schemeClr val="accent1">
+            <a:schemeClr val="accent4">
               <a:shade val="50000"/>
             </a:schemeClr>
           </a:lnRef>
           <a:fillRef idx="1">
-            <a:schemeClr val="accent1"/>
+            <a:schemeClr val="accent4"/>
           </a:fillRef>
           <a:effectRef idx="0">
-            <a:schemeClr val="accent1"/>
+            <a:schemeClr val="accent4"/>
           </a:effectRef>
           <a:fontRef idx="minor">
             <a:schemeClr val="lt1"/>
@@ -3462,10 +3462,18 @@
           <a:p>
             <a:pPr algn="ctr"/>
             <a:r>
-              <a:rPr lang="en-US" dirty="0" err="1"/>
+              <a:rPr lang="en-US" dirty="0" err="1">
+                <a:highlight>
+                  <a:srgbClr val="FFFF00"/>
+                </a:highlight>
+              </a:rPr>
               <a:t>rentACar</a:t>
             </a:r>
-            <a:endParaRPr lang="en-US" dirty="0"/>
+            <a:endParaRPr lang="en-US" dirty="0">
+              <a:highlight>
+                <a:srgbClr val="FFFF00"/>
+              </a:highlight>
+            </a:endParaRPr>
           </a:p>
         </p:txBody>
       </p:sp>
@@ -3513,7 +3521,7 @@
             <a:pPr algn="ctr"/>
             <a:r>
               <a:rPr lang="en-US" sz="1400" dirty="0"/>
-              <a:t>Borrower 1</a:t>
+              <a:t>Customer 1</a:t>
             </a:r>
           </a:p>
         </p:txBody>
@@ -3562,7 +3570,7 @@
             <a:pPr algn="ctr"/>
             <a:r>
               <a:rPr lang="en-US" sz="1400" dirty="0"/>
-              <a:t>Borrower 2</a:t>
+              <a:t>Customer 2</a:t>
             </a:r>
           </a:p>
         </p:txBody>
@@ -3611,7 +3619,7 @@
             <a:pPr algn="ctr"/>
             <a:r>
               <a:rPr lang="en-US" sz="1400" dirty="0"/>
-              <a:t>Borrower 3</a:t>
+              <a:t>Customer 3</a:t>
             </a:r>
           </a:p>
         </p:txBody>
@@ -3635,7 +3643,7 @@
         <p:spPr>
           <a:xfrm flipH="1">
             <a:off x="7243482" y="936812"/>
-            <a:ext cx="1828801" cy="1833283"/>
+            <a:ext cx="1828801" cy="2637864"/>
           </a:xfrm>
           <a:prstGeom prst="straightConnector1">
             <a:avLst/>
@@ -3677,8 +3685,8 @@
         </p:nvCxnSpPr>
         <p:spPr>
           <a:xfrm flipH="1" flipV="1">
-            <a:off x="7243482" y="2770095"/>
-            <a:ext cx="1891553" cy="2433917"/>
+            <a:off x="7243482" y="3574676"/>
+            <a:ext cx="1891553" cy="1629336"/>
           </a:xfrm>
           <a:prstGeom prst="straightConnector1">
             <a:avLst/>
@@ -3719,9 +3727,9 @@
           <p:nvPr/>
         </p:nvCxnSpPr>
         <p:spPr>
-          <a:xfrm flipH="1" flipV="1">
-            <a:off x="7243482" y="2770095"/>
-            <a:ext cx="1828800" cy="300317"/>
+          <a:xfrm flipH="1">
+            <a:off x="7243482" y="3070412"/>
+            <a:ext cx="1828800" cy="504264"/>
           </a:xfrm>
           <a:prstGeom prst="straightConnector1">
             <a:avLst/>
@@ -3764,7 +3772,7 @@
         <p:spPr>
           <a:xfrm flipH="1" flipV="1">
             <a:off x="3621741" y="2541495"/>
-            <a:ext cx="1246094" cy="228600"/>
+            <a:ext cx="1246094" cy="1033181"/>
           </a:xfrm>
           <a:prstGeom prst="straightConnector1">
             <a:avLst/>
@@ -3790,10 +3798,10 @@
       </p:cxnSp>
       <p:sp>
         <p:nvSpPr>
-          <p:cNvPr id="24" name="Rectangle 23">
-            <a:extLst>
-              <a:ext uri="{FF2B5EF4-FFF2-40B4-BE49-F238E27FC236}">
-                <a16:creationId xmlns:a16="http://schemas.microsoft.com/office/drawing/2014/main" id="{A5B9E84C-E73B-4A5B-86F8-970E8AE5AD9E}"/>
+          <p:cNvPr id="34" name="Rectangle 33">
+            <a:extLst>
+              <a:ext uri="{FF2B5EF4-FFF2-40B4-BE49-F238E27FC236}">
+                <a16:creationId xmlns:a16="http://schemas.microsoft.com/office/drawing/2014/main" id="{117D22A8-E45F-E2D3-676B-4F42A270AC21}"/>
               </a:ext>
             </a:extLst>
           </p:cNvPr>
@@ -3802,8 +3810,8 @@
         </p:nvSpPr>
         <p:spPr>
           <a:xfrm>
-            <a:off x="1515036" y="4495800"/>
-            <a:ext cx="2375647" cy="587187"/>
+            <a:off x="5031993" y="2483225"/>
+            <a:ext cx="2048315" cy="587187"/>
           </a:xfrm>
           <a:prstGeom prst="rect">
             <a:avLst/>
@@ -3839,10 +3847,10 @@
       </p:sp>
       <p:sp>
         <p:nvSpPr>
-          <p:cNvPr id="25" name="Rectangle 24">
-            <a:extLst>
-              <a:ext uri="{FF2B5EF4-FFF2-40B4-BE49-F238E27FC236}">
-                <a16:creationId xmlns:a16="http://schemas.microsoft.com/office/drawing/2014/main" id="{128CCE51-2FC5-4C6B-8FAA-364AFEB7390F}"/>
+          <p:cNvPr id="35" name="Rectangle 34">
+            <a:extLst>
+              <a:ext uri="{FF2B5EF4-FFF2-40B4-BE49-F238E27FC236}">
+                <a16:creationId xmlns:a16="http://schemas.microsoft.com/office/drawing/2014/main" id="{B3EE6F0F-22FB-54CC-924B-B25DD727893D}"/>
               </a:ext>
             </a:extLst>
           </p:cNvPr>
@@ -3851,8 +3859,8 @@
         </p:nvSpPr>
         <p:spPr>
           <a:xfrm>
-            <a:off x="1515034" y="5921187"/>
-            <a:ext cx="2375647" cy="587187"/>
+            <a:off x="5031991" y="3908612"/>
+            <a:ext cx="2048315" cy="587187"/>
           </a:xfrm>
           <a:prstGeom prst="rect">
             <a:avLst/>
@@ -3888,10 +3896,10 @@
       </p:sp>
       <p:sp>
         <p:nvSpPr>
-          <p:cNvPr id="26" name="Rectangle 25">
-            <a:extLst>
-              <a:ext uri="{FF2B5EF4-FFF2-40B4-BE49-F238E27FC236}">
-                <a16:creationId xmlns:a16="http://schemas.microsoft.com/office/drawing/2014/main" id="{49F02D04-FAF7-4AFB-B4EB-D6BEE81FE3E2}"/>
+          <p:cNvPr id="36" name="Rectangle 35">
+            <a:extLst>
+              <a:ext uri="{FF2B5EF4-FFF2-40B4-BE49-F238E27FC236}">
+                <a16:creationId xmlns:a16="http://schemas.microsoft.com/office/drawing/2014/main" id="{BF3153E5-4177-F863-DD76-ADC004E41062}"/>
               </a:ext>
             </a:extLst>
           </p:cNvPr>
@@ -3900,8 +3908,8 @@
         </p:nvSpPr>
         <p:spPr>
           <a:xfrm>
-            <a:off x="1515035" y="5208493"/>
-            <a:ext cx="2375647" cy="587187"/>
+            <a:off x="5031992" y="3195918"/>
+            <a:ext cx="2048315" cy="587187"/>
           </a:xfrm>
           <a:prstGeom prst="rect">
             <a:avLst/>
@@ -3931,6 +3939,47 @@
             <a:r>
               <a:rPr lang="en-US" dirty="0"/>
               <a:t>Car B</a:t>
+            </a:r>
+          </a:p>
+        </p:txBody>
+      </p:sp>
+      <p:sp>
+        <p:nvSpPr>
+          <p:cNvPr id="37" name="TextBox 36">
+            <a:extLst>
+              <a:ext uri="{FF2B5EF4-FFF2-40B4-BE49-F238E27FC236}">
+                <a16:creationId xmlns:a16="http://schemas.microsoft.com/office/drawing/2014/main" id="{AAA11970-8358-4681-DE3F-6DD6CAD47ABD}"/>
+              </a:ext>
+            </a:extLst>
+          </p:cNvPr>
+          <p:cNvSpPr txBox="1"/>
+          <p:nvPr/>
+        </p:nvSpPr>
+        <p:spPr>
+          <a:xfrm>
+            <a:off x="5159229" y="4773336"/>
+            <a:ext cx="1908664" cy="646331"/>
+          </a:xfrm>
+          <a:prstGeom prst="rect">
+            <a:avLst/>
+          </a:prstGeom>
+          <a:noFill/>
+        </p:spPr>
+        <p:txBody>
+          <a:bodyPr wrap="none" rtlCol="0">
+            <a:spAutoFit/>
+          </a:bodyPr>
+          <a:lstStyle/>
+          <a:p>
+            <a:r>
+              <a:rPr lang="en-US" dirty="0"/>
+              <a:t>Checking available</a:t>
+            </a:r>
+          </a:p>
+          <a:p>
+            <a:r>
+              <a:rPr lang="en-US" dirty="0"/>
+              <a:t>Rent, return.</a:t>
             </a:r>
           </a:p>
         </p:txBody>

</xml_diff>